<commit_message>
Atualizado o `.pptx` e `.pdf` com a apresentação
</commit_message>
<xml_diff>
--- a/PresentationOnSleepHealthAndLifestyleData.pptx
+++ b/PresentationOnSleepHealthAndLifestyleData.pptx
@@ -14,30 +14,37 @@
     <p:sldId id="259" r:id="rId10"/>
     <p:sldId id="260" r:id="rId11"/>
     <p:sldId id="261" r:id="rId12"/>
+    <p:sldId id="262" r:id="rId13"/>
+    <p:sldId id="263" r:id="rId14"/>
+    <p:sldId id="264" r:id="rId15"/>
+    <p:sldId id="265" r:id="rId16"/>
+    <p:sldId id="266" r:id="rId17"/>
+    <p:sldId id="267" r:id="rId18"/>
+    <p:sldId id="268" r:id="rId19"/>
   </p:sldIdLst>
   <p:sldSz cy="10287000" cx="18288000"/>
   <p:notesSz cx="6858000" cy="9144000"/>
   <p:embeddedFontLst>
     <p:embeddedFont>
       <p:font typeface="Roboto Mono Light"/>
-      <p:regular r:id="rId13"/>
-      <p:bold r:id="rId14"/>
-      <p:italic r:id="rId15"/>
-      <p:boldItalic r:id="rId16"/>
+      <p:regular r:id="rId20"/>
+      <p:bold r:id="rId21"/>
+      <p:italic r:id="rId22"/>
+      <p:boldItalic r:id="rId23"/>
     </p:embeddedFont>
     <p:embeddedFont>
       <p:font typeface="Open Sans Light"/>
-      <p:regular r:id="rId17"/>
-      <p:bold r:id="rId18"/>
-      <p:italic r:id="rId19"/>
-      <p:boldItalic r:id="rId20"/>
+      <p:regular r:id="rId24"/>
+      <p:bold r:id="rId25"/>
+      <p:italic r:id="rId26"/>
+      <p:boldItalic r:id="rId27"/>
     </p:embeddedFont>
     <p:embeddedFont>
       <p:font typeface="Open Sans"/>
-      <p:regular r:id="rId21"/>
-      <p:bold r:id="rId22"/>
-      <p:italic r:id="rId23"/>
-      <p:boldItalic r:id="rId24"/>
+      <p:regular r:id="rId28"/>
+      <p:bold r:id="rId29"/>
+      <p:italic r:id="rId30"/>
+      <p:boldItalic r:id="rId31"/>
     </p:embeddedFont>
   </p:embeddedFontLst>
   <p:defaultTextStyle>
@@ -827,6 +834,402 @@
 </p:notes>
 </file>
 
+<file path=ppt/notesSlides/notesSlide10.xml><?xml version="1.0" encoding="utf-8"?>
+<p:notes xmlns:a="http://schemas.openxmlformats.org/drawingml/2006/main" xmlns:r="http://schemas.openxmlformats.org/officeDocument/2006/relationships" xmlns:mc="http://schemas.openxmlformats.org/markup-compatibility/2006" xmlns:mv="urn:schemas-microsoft-com:mac:vml" xmlns:p="http://schemas.openxmlformats.org/presentationml/2006/main" xmlns:c="http://schemas.openxmlformats.org/drawingml/2006/chart" xmlns:dgm="http://schemas.openxmlformats.org/drawingml/2006/diagram" xmlns:o="urn:schemas-microsoft-com:office:office" xmlns:v="urn:schemas-microsoft-com:vml" xmlns:pvml="urn:schemas-microsoft-com:office:powerpoint" xmlns:com="http://schemas.openxmlformats.org/drawingml/2006/compatibility" xmlns:p14="http://schemas.microsoft.com/office/powerpoint/2010/main" xmlns:p15="http://schemas.microsoft.com/office/powerpoint/2012/main" xmlns:ahyp="http://schemas.microsoft.com/office/drawing/2018/hyperlinkcolor" showMasterPhAnim="0" showMasterSp="0">
+  <p:cSld>
+    <p:spTree>
+      <p:nvGrpSpPr>
+        <p:cNvPr id="166" name="Shape 166"/>
+        <p:cNvGrpSpPr/>
+        <p:nvPr/>
+      </p:nvGrpSpPr>
+      <p:grpSpPr>
+        <a:xfrm>
+          <a:off x="0" y="0"/>
+          <a:ext cx="0" cy="0"/>
+          <a:chOff x="0" y="0"/>
+          <a:chExt cx="0" cy="0"/>
+        </a:xfrm>
+      </p:grpSpPr>
+      <p:sp>
+        <p:nvSpPr>
+          <p:cNvPr id="167" name="Google Shape;167;g3a9018bbb98_0_39:notes"/>
+          <p:cNvSpPr/>
+          <p:nvPr>
+            <p:ph idx="2" type="sldImg"/>
+          </p:nvPr>
+        </p:nvSpPr>
+        <p:spPr>
+          <a:xfrm>
+            <a:off x="381300" y="685800"/>
+            <a:ext cx="6096000" cy="3429000"/>
+          </a:xfrm>
+          <a:custGeom>
+            <a:rect b="b" l="l" r="r" t="t"/>
+            <a:pathLst>
+              <a:path extrusionOk="0" h="120000" w="120000">
+                <a:moveTo>
+                  <a:pt x="0" y="0"/>
+                </a:moveTo>
+                <a:lnTo>
+                  <a:pt x="120000" y="0"/>
+                </a:lnTo>
+                <a:lnTo>
+                  <a:pt x="120000" y="120000"/>
+                </a:lnTo>
+                <a:lnTo>
+                  <a:pt x="0" y="120000"/>
+                </a:lnTo>
+                <a:close/>
+              </a:path>
+            </a:pathLst>
+          </a:custGeom>
+        </p:spPr>
+      </p:sp>
+      <p:sp>
+        <p:nvSpPr>
+          <p:cNvPr id="168" name="Google Shape;168;g3a9018bbb98_0_39:notes"/>
+          <p:cNvSpPr txBox="1"/>
+          <p:nvPr>
+            <p:ph idx="1" type="body"/>
+          </p:nvPr>
+        </p:nvSpPr>
+        <p:spPr>
+          <a:xfrm>
+            <a:off x="685800" y="4343400"/>
+            <a:ext cx="5486400" cy="4114800"/>
+          </a:xfrm>
+          <a:prstGeom prst="rect">
+            <a:avLst/>
+          </a:prstGeom>
+        </p:spPr>
+        <p:txBody>
+          <a:bodyPr anchorCtr="0" anchor="t" bIns="91425" lIns="91425" spcFirstLastPara="1" rIns="91425" wrap="square" tIns="91425">
+            <a:noAutofit/>
+          </a:bodyPr>
+          <a:lstStyle/>
+          <a:p>
+            <a:pPr indent="0" lvl="0" marL="0" rtl="0" algn="l">
+              <a:spcBef>
+                <a:spcPts val="0"/>
+              </a:spcBef>
+              <a:spcAft>
+                <a:spcPts val="0"/>
+              </a:spcAft>
+              <a:buNone/>
+            </a:pPr>
+            <a:r>
+              <a:t/>
+            </a:r>
+            <a:endParaRPr/>
+          </a:p>
+        </p:txBody>
+      </p:sp>
+    </p:spTree>
+  </p:cSld>
+  <p:clrMapOvr>
+    <a:masterClrMapping/>
+  </p:clrMapOvr>
+</p:notes>
+</file>
+
+<file path=ppt/notesSlides/notesSlide11.xml><?xml version="1.0" encoding="utf-8"?>
+<p:notes xmlns:a="http://schemas.openxmlformats.org/drawingml/2006/main" xmlns:r="http://schemas.openxmlformats.org/officeDocument/2006/relationships" xmlns:mc="http://schemas.openxmlformats.org/markup-compatibility/2006" xmlns:mv="urn:schemas-microsoft-com:mac:vml" xmlns:p="http://schemas.openxmlformats.org/presentationml/2006/main" xmlns:c="http://schemas.openxmlformats.org/drawingml/2006/chart" xmlns:dgm="http://schemas.openxmlformats.org/drawingml/2006/diagram" xmlns:o="urn:schemas-microsoft-com:office:office" xmlns:v="urn:schemas-microsoft-com:vml" xmlns:pvml="urn:schemas-microsoft-com:office:powerpoint" xmlns:com="http://schemas.openxmlformats.org/drawingml/2006/compatibility" xmlns:p14="http://schemas.microsoft.com/office/powerpoint/2010/main" xmlns:p15="http://schemas.microsoft.com/office/powerpoint/2012/main" xmlns:ahyp="http://schemas.microsoft.com/office/drawing/2018/hyperlinkcolor" showMasterPhAnim="0" showMasterSp="0">
+  <p:cSld>
+    <p:spTree>
+      <p:nvGrpSpPr>
+        <p:cNvPr id="172" name="Shape 172"/>
+        <p:cNvGrpSpPr/>
+        <p:nvPr/>
+      </p:nvGrpSpPr>
+      <p:grpSpPr>
+        <a:xfrm>
+          <a:off x="0" y="0"/>
+          <a:ext cx="0" cy="0"/>
+          <a:chOff x="0" y="0"/>
+          <a:chExt cx="0" cy="0"/>
+        </a:xfrm>
+      </p:grpSpPr>
+      <p:sp>
+        <p:nvSpPr>
+          <p:cNvPr id="173" name="Google Shape;173;g3a9018bbb98_0_45:notes"/>
+          <p:cNvSpPr/>
+          <p:nvPr>
+            <p:ph idx="2" type="sldImg"/>
+          </p:nvPr>
+        </p:nvSpPr>
+        <p:spPr>
+          <a:xfrm>
+            <a:off x="381300" y="685800"/>
+            <a:ext cx="6096000" cy="3429000"/>
+          </a:xfrm>
+          <a:custGeom>
+            <a:rect b="b" l="l" r="r" t="t"/>
+            <a:pathLst>
+              <a:path extrusionOk="0" h="120000" w="120000">
+                <a:moveTo>
+                  <a:pt x="0" y="0"/>
+                </a:moveTo>
+                <a:lnTo>
+                  <a:pt x="120000" y="0"/>
+                </a:lnTo>
+                <a:lnTo>
+                  <a:pt x="120000" y="120000"/>
+                </a:lnTo>
+                <a:lnTo>
+                  <a:pt x="0" y="120000"/>
+                </a:lnTo>
+                <a:close/>
+              </a:path>
+            </a:pathLst>
+          </a:custGeom>
+        </p:spPr>
+      </p:sp>
+      <p:sp>
+        <p:nvSpPr>
+          <p:cNvPr id="174" name="Google Shape;174;g3a9018bbb98_0_45:notes"/>
+          <p:cNvSpPr txBox="1"/>
+          <p:nvPr>
+            <p:ph idx="1" type="body"/>
+          </p:nvPr>
+        </p:nvSpPr>
+        <p:spPr>
+          <a:xfrm>
+            <a:off x="685800" y="4343400"/>
+            <a:ext cx="5486400" cy="4114800"/>
+          </a:xfrm>
+          <a:prstGeom prst="rect">
+            <a:avLst/>
+          </a:prstGeom>
+        </p:spPr>
+        <p:txBody>
+          <a:bodyPr anchorCtr="0" anchor="t" bIns="91425" lIns="91425" spcFirstLastPara="1" rIns="91425" wrap="square" tIns="91425">
+            <a:noAutofit/>
+          </a:bodyPr>
+          <a:lstStyle/>
+          <a:p>
+            <a:pPr indent="0" lvl="0" marL="0" rtl="0" algn="l">
+              <a:spcBef>
+                <a:spcPts val="0"/>
+              </a:spcBef>
+              <a:spcAft>
+                <a:spcPts val="0"/>
+              </a:spcAft>
+              <a:buNone/>
+            </a:pPr>
+            <a:r>
+              <a:t/>
+            </a:r>
+            <a:endParaRPr/>
+          </a:p>
+        </p:txBody>
+      </p:sp>
+    </p:spTree>
+  </p:cSld>
+  <p:clrMapOvr>
+    <a:masterClrMapping/>
+  </p:clrMapOvr>
+</p:notes>
+</file>
+
+<file path=ppt/notesSlides/notesSlide12.xml><?xml version="1.0" encoding="utf-8"?>
+<p:notes xmlns:a="http://schemas.openxmlformats.org/drawingml/2006/main" xmlns:r="http://schemas.openxmlformats.org/officeDocument/2006/relationships" xmlns:mc="http://schemas.openxmlformats.org/markup-compatibility/2006" xmlns:mv="urn:schemas-microsoft-com:mac:vml" xmlns:p="http://schemas.openxmlformats.org/presentationml/2006/main" xmlns:c="http://schemas.openxmlformats.org/drawingml/2006/chart" xmlns:dgm="http://schemas.openxmlformats.org/drawingml/2006/diagram" xmlns:o="urn:schemas-microsoft-com:office:office" xmlns:v="urn:schemas-microsoft-com:vml" xmlns:pvml="urn:schemas-microsoft-com:office:powerpoint" xmlns:com="http://schemas.openxmlformats.org/drawingml/2006/compatibility" xmlns:p14="http://schemas.microsoft.com/office/powerpoint/2010/main" xmlns:p15="http://schemas.microsoft.com/office/powerpoint/2012/main" xmlns:ahyp="http://schemas.microsoft.com/office/drawing/2018/hyperlinkcolor" showMasterPhAnim="0" showMasterSp="0">
+  <p:cSld>
+    <p:spTree>
+      <p:nvGrpSpPr>
+        <p:cNvPr id="179" name="Shape 179"/>
+        <p:cNvGrpSpPr/>
+        <p:nvPr/>
+      </p:nvGrpSpPr>
+      <p:grpSpPr>
+        <a:xfrm>
+          <a:off x="0" y="0"/>
+          <a:ext cx="0" cy="0"/>
+          <a:chOff x="0" y="0"/>
+          <a:chExt cx="0" cy="0"/>
+        </a:xfrm>
+      </p:grpSpPr>
+      <p:sp>
+        <p:nvSpPr>
+          <p:cNvPr id="180" name="Google Shape;180;g3a9018bbb98_0_52:notes"/>
+          <p:cNvSpPr/>
+          <p:nvPr>
+            <p:ph idx="2" type="sldImg"/>
+          </p:nvPr>
+        </p:nvSpPr>
+        <p:spPr>
+          <a:xfrm>
+            <a:off x="381300" y="685800"/>
+            <a:ext cx="6096000" cy="3429000"/>
+          </a:xfrm>
+          <a:custGeom>
+            <a:rect b="b" l="l" r="r" t="t"/>
+            <a:pathLst>
+              <a:path extrusionOk="0" h="120000" w="120000">
+                <a:moveTo>
+                  <a:pt x="0" y="0"/>
+                </a:moveTo>
+                <a:lnTo>
+                  <a:pt x="120000" y="0"/>
+                </a:lnTo>
+                <a:lnTo>
+                  <a:pt x="120000" y="120000"/>
+                </a:lnTo>
+                <a:lnTo>
+                  <a:pt x="0" y="120000"/>
+                </a:lnTo>
+                <a:close/>
+              </a:path>
+            </a:pathLst>
+          </a:custGeom>
+        </p:spPr>
+      </p:sp>
+      <p:sp>
+        <p:nvSpPr>
+          <p:cNvPr id="181" name="Google Shape;181;g3a9018bbb98_0_52:notes"/>
+          <p:cNvSpPr txBox="1"/>
+          <p:nvPr>
+            <p:ph idx="1" type="body"/>
+          </p:nvPr>
+        </p:nvSpPr>
+        <p:spPr>
+          <a:xfrm>
+            <a:off x="685800" y="4343400"/>
+            <a:ext cx="5486400" cy="4114800"/>
+          </a:xfrm>
+          <a:prstGeom prst="rect">
+            <a:avLst/>
+          </a:prstGeom>
+        </p:spPr>
+        <p:txBody>
+          <a:bodyPr anchorCtr="0" anchor="t" bIns="91425" lIns="91425" spcFirstLastPara="1" rIns="91425" wrap="square" tIns="91425">
+            <a:noAutofit/>
+          </a:bodyPr>
+          <a:lstStyle/>
+          <a:p>
+            <a:pPr indent="0" lvl="0" marL="0" rtl="0" algn="l">
+              <a:spcBef>
+                <a:spcPts val="0"/>
+              </a:spcBef>
+              <a:spcAft>
+                <a:spcPts val="0"/>
+              </a:spcAft>
+              <a:buNone/>
+            </a:pPr>
+            <a:r>
+              <a:t/>
+            </a:r>
+            <a:endParaRPr/>
+          </a:p>
+        </p:txBody>
+      </p:sp>
+    </p:spTree>
+  </p:cSld>
+  <p:clrMapOvr>
+    <a:masterClrMapping/>
+  </p:clrMapOvr>
+</p:notes>
+</file>
+
+<file path=ppt/notesSlides/notesSlide13.xml><?xml version="1.0" encoding="utf-8"?>
+<p:notes xmlns:a="http://schemas.openxmlformats.org/drawingml/2006/main" xmlns:r="http://schemas.openxmlformats.org/officeDocument/2006/relationships" xmlns:mc="http://schemas.openxmlformats.org/markup-compatibility/2006" xmlns:mv="urn:schemas-microsoft-com:mac:vml" xmlns:p="http://schemas.openxmlformats.org/presentationml/2006/main" xmlns:c="http://schemas.openxmlformats.org/drawingml/2006/chart" xmlns:dgm="http://schemas.openxmlformats.org/drawingml/2006/diagram" xmlns:o="urn:schemas-microsoft-com:office:office" xmlns:v="urn:schemas-microsoft-com:vml" xmlns:pvml="urn:schemas-microsoft-com:office:powerpoint" xmlns:com="http://schemas.openxmlformats.org/drawingml/2006/compatibility" xmlns:p14="http://schemas.microsoft.com/office/powerpoint/2010/main" xmlns:p15="http://schemas.microsoft.com/office/powerpoint/2012/main" xmlns:ahyp="http://schemas.microsoft.com/office/drawing/2018/hyperlinkcolor" showMasterPhAnim="0" showMasterSp="0">
+  <p:cSld>
+    <p:spTree>
+      <p:nvGrpSpPr>
+        <p:cNvPr id="186" name="Shape 186"/>
+        <p:cNvGrpSpPr/>
+        <p:nvPr/>
+      </p:nvGrpSpPr>
+      <p:grpSpPr>
+        <a:xfrm>
+          <a:off x="0" y="0"/>
+          <a:ext cx="0" cy="0"/>
+          <a:chOff x="0" y="0"/>
+          <a:chExt cx="0" cy="0"/>
+        </a:xfrm>
+      </p:grpSpPr>
+      <p:sp>
+        <p:nvSpPr>
+          <p:cNvPr id="187" name="Google Shape;187;g3a9018bbb98_0_60:notes"/>
+          <p:cNvSpPr/>
+          <p:nvPr>
+            <p:ph idx="2" type="sldImg"/>
+          </p:nvPr>
+        </p:nvSpPr>
+        <p:spPr>
+          <a:xfrm>
+            <a:off x="381300" y="685800"/>
+            <a:ext cx="6096000" cy="3429000"/>
+          </a:xfrm>
+          <a:custGeom>
+            <a:rect b="b" l="l" r="r" t="t"/>
+            <a:pathLst>
+              <a:path extrusionOk="0" h="120000" w="120000">
+                <a:moveTo>
+                  <a:pt x="0" y="0"/>
+                </a:moveTo>
+                <a:lnTo>
+                  <a:pt x="120000" y="0"/>
+                </a:lnTo>
+                <a:lnTo>
+                  <a:pt x="120000" y="120000"/>
+                </a:lnTo>
+                <a:lnTo>
+                  <a:pt x="0" y="120000"/>
+                </a:lnTo>
+                <a:close/>
+              </a:path>
+            </a:pathLst>
+          </a:custGeom>
+        </p:spPr>
+      </p:sp>
+      <p:sp>
+        <p:nvSpPr>
+          <p:cNvPr id="188" name="Google Shape;188;g3a9018bbb98_0_60:notes"/>
+          <p:cNvSpPr txBox="1"/>
+          <p:nvPr>
+            <p:ph idx="1" type="body"/>
+          </p:nvPr>
+        </p:nvSpPr>
+        <p:spPr>
+          <a:xfrm>
+            <a:off x="685800" y="4343400"/>
+            <a:ext cx="5486400" cy="4114800"/>
+          </a:xfrm>
+          <a:prstGeom prst="rect">
+            <a:avLst/>
+          </a:prstGeom>
+        </p:spPr>
+        <p:txBody>
+          <a:bodyPr anchorCtr="0" anchor="t" bIns="91425" lIns="91425" spcFirstLastPara="1" rIns="91425" wrap="square" tIns="91425">
+            <a:noAutofit/>
+          </a:bodyPr>
+          <a:lstStyle/>
+          <a:p>
+            <a:pPr indent="0" lvl="0" marL="0" rtl="0" algn="l">
+              <a:spcBef>
+                <a:spcPts val="0"/>
+              </a:spcBef>
+              <a:spcAft>
+                <a:spcPts val="0"/>
+              </a:spcAft>
+              <a:buNone/>
+            </a:pPr>
+            <a:r>
+              <a:t/>
+            </a:r>
+            <a:endParaRPr/>
+          </a:p>
+        </p:txBody>
+      </p:sp>
+    </p:spTree>
+  </p:cSld>
+  <p:clrMapOvr>
+    <a:masterClrMapping/>
+  </p:clrMapOvr>
+</p:notes>
+</file>
+
 <file path=ppt/notesSlides/notesSlide2.xml><?xml version="1.0" encoding="utf-8"?>
 <p:notes xmlns:a="http://schemas.openxmlformats.org/drawingml/2006/main" xmlns:r="http://schemas.openxmlformats.org/officeDocument/2006/relationships" xmlns:mc="http://schemas.openxmlformats.org/markup-compatibility/2006" xmlns:mv="urn:schemas-microsoft-com:mac:vml" xmlns:p="http://schemas.openxmlformats.org/presentationml/2006/main" xmlns:c="http://schemas.openxmlformats.org/drawingml/2006/chart" xmlns:dgm="http://schemas.openxmlformats.org/drawingml/2006/diagram" xmlns:o="urn:schemas-microsoft-com:office:office" xmlns:v="urn:schemas-microsoft-com:vml" xmlns:pvml="urn:schemas-microsoft-com:office:powerpoint" xmlns:com="http://schemas.openxmlformats.org/drawingml/2006/compatibility" xmlns:p14="http://schemas.microsoft.com/office/powerpoint/2010/main" xmlns:p15="http://schemas.microsoft.com/office/powerpoint/2012/main" xmlns:ahyp="http://schemas.microsoft.com/office/drawing/2018/hyperlinkcolor" showMasterPhAnim="0" showMasterSp="0">
   <p:cSld>
@@ -1278,6 +1681,303 @@
       <p:sp>
         <p:nvSpPr>
           <p:cNvPr id="139" name="Google Shape;139;g3a9018bbb98_0_10:notes"/>
+          <p:cNvSpPr txBox="1"/>
+          <p:nvPr>
+            <p:ph idx="1" type="body"/>
+          </p:nvPr>
+        </p:nvSpPr>
+        <p:spPr>
+          <a:xfrm>
+            <a:off x="685800" y="4343400"/>
+            <a:ext cx="5486400" cy="4114800"/>
+          </a:xfrm>
+          <a:prstGeom prst="rect">
+            <a:avLst/>
+          </a:prstGeom>
+        </p:spPr>
+        <p:txBody>
+          <a:bodyPr anchorCtr="0" anchor="t" bIns="91425" lIns="91425" spcFirstLastPara="1" rIns="91425" wrap="square" tIns="91425">
+            <a:noAutofit/>
+          </a:bodyPr>
+          <a:lstStyle/>
+          <a:p>
+            <a:pPr indent="0" lvl="0" marL="0" rtl="0" algn="l">
+              <a:spcBef>
+                <a:spcPts val="0"/>
+              </a:spcBef>
+              <a:spcAft>
+                <a:spcPts val="0"/>
+              </a:spcAft>
+              <a:buNone/>
+            </a:pPr>
+            <a:r>
+              <a:t/>
+            </a:r>
+            <a:endParaRPr/>
+          </a:p>
+        </p:txBody>
+      </p:sp>
+    </p:spTree>
+  </p:cSld>
+  <p:clrMapOvr>
+    <a:masterClrMapping/>
+  </p:clrMapOvr>
+</p:notes>
+</file>
+
+<file path=ppt/notesSlides/notesSlide7.xml><?xml version="1.0" encoding="utf-8"?>
+<p:notes xmlns:a="http://schemas.openxmlformats.org/drawingml/2006/main" xmlns:r="http://schemas.openxmlformats.org/officeDocument/2006/relationships" xmlns:mc="http://schemas.openxmlformats.org/markup-compatibility/2006" xmlns:mv="urn:schemas-microsoft-com:mac:vml" xmlns:p="http://schemas.openxmlformats.org/presentationml/2006/main" xmlns:c="http://schemas.openxmlformats.org/drawingml/2006/chart" xmlns:dgm="http://schemas.openxmlformats.org/drawingml/2006/diagram" xmlns:o="urn:schemas-microsoft-com:office:office" xmlns:v="urn:schemas-microsoft-com:vml" xmlns:pvml="urn:schemas-microsoft-com:office:powerpoint" xmlns:com="http://schemas.openxmlformats.org/drawingml/2006/compatibility" xmlns:p14="http://schemas.microsoft.com/office/powerpoint/2010/main" xmlns:p15="http://schemas.microsoft.com/office/powerpoint/2012/main" xmlns:ahyp="http://schemas.microsoft.com/office/drawing/2018/hyperlinkcolor" showMasterPhAnim="0" showMasterSp="0">
+  <p:cSld>
+    <p:spTree>
+      <p:nvGrpSpPr>
+        <p:cNvPr id="145" name="Shape 145"/>
+        <p:cNvGrpSpPr/>
+        <p:nvPr/>
+      </p:nvGrpSpPr>
+      <p:grpSpPr>
+        <a:xfrm>
+          <a:off x="0" y="0"/>
+          <a:ext cx="0" cy="0"/>
+          <a:chOff x="0" y="0"/>
+          <a:chExt cx="0" cy="0"/>
+        </a:xfrm>
+      </p:grpSpPr>
+      <p:sp>
+        <p:nvSpPr>
+          <p:cNvPr id="146" name="Google Shape;146;g3a9018bbb98_0_17:notes"/>
+          <p:cNvSpPr/>
+          <p:nvPr>
+            <p:ph idx="2" type="sldImg"/>
+          </p:nvPr>
+        </p:nvSpPr>
+        <p:spPr>
+          <a:xfrm>
+            <a:off x="381300" y="685800"/>
+            <a:ext cx="6096000" cy="3429000"/>
+          </a:xfrm>
+          <a:custGeom>
+            <a:rect b="b" l="l" r="r" t="t"/>
+            <a:pathLst>
+              <a:path extrusionOk="0" h="120000" w="120000">
+                <a:moveTo>
+                  <a:pt x="0" y="0"/>
+                </a:moveTo>
+                <a:lnTo>
+                  <a:pt x="120000" y="0"/>
+                </a:lnTo>
+                <a:lnTo>
+                  <a:pt x="120000" y="120000"/>
+                </a:lnTo>
+                <a:lnTo>
+                  <a:pt x="0" y="120000"/>
+                </a:lnTo>
+                <a:close/>
+              </a:path>
+            </a:pathLst>
+          </a:custGeom>
+        </p:spPr>
+      </p:sp>
+      <p:sp>
+        <p:nvSpPr>
+          <p:cNvPr id="147" name="Google Shape;147;g3a9018bbb98_0_17:notes"/>
+          <p:cNvSpPr txBox="1"/>
+          <p:nvPr>
+            <p:ph idx="1" type="body"/>
+          </p:nvPr>
+        </p:nvSpPr>
+        <p:spPr>
+          <a:xfrm>
+            <a:off x="685800" y="4343400"/>
+            <a:ext cx="5486400" cy="4114800"/>
+          </a:xfrm>
+          <a:prstGeom prst="rect">
+            <a:avLst/>
+          </a:prstGeom>
+        </p:spPr>
+        <p:txBody>
+          <a:bodyPr anchorCtr="0" anchor="t" bIns="91425" lIns="91425" spcFirstLastPara="1" rIns="91425" wrap="square" tIns="91425">
+            <a:noAutofit/>
+          </a:bodyPr>
+          <a:lstStyle/>
+          <a:p>
+            <a:pPr indent="0" lvl="0" marL="0" rtl="0" algn="l">
+              <a:spcBef>
+                <a:spcPts val="0"/>
+              </a:spcBef>
+              <a:spcAft>
+                <a:spcPts val="0"/>
+              </a:spcAft>
+              <a:buNone/>
+            </a:pPr>
+            <a:r>
+              <a:t/>
+            </a:r>
+            <a:endParaRPr/>
+          </a:p>
+        </p:txBody>
+      </p:sp>
+    </p:spTree>
+  </p:cSld>
+  <p:clrMapOvr>
+    <a:masterClrMapping/>
+  </p:clrMapOvr>
+</p:notes>
+</file>
+
+<file path=ppt/notesSlides/notesSlide8.xml><?xml version="1.0" encoding="utf-8"?>
+<p:notes xmlns:a="http://schemas.openxmlformats.org/drawingml/2006/main" xmlns:r="http://schemas.openxmlformats.org/officeDocument/2006/relationships" xmlns:mc="http://schemas.openxmlformats.org/markup-compatibility/2006" xmlns:mv="urn:schemas-microsoft-com:mac:vml" xmlns:p="http://schemas.openxmlformats.org/presentationml/2006/main" xmlns:c="http://schemas.openxmlformats.org/drawingml/2006/chart" xmlns:dgm="http://schemas.openxmlformats.org/drawingml/2006/diagram" xmlns:o="urn:schemas-microsoft-com:office:office" xmlns:v="urn:schemas-microsoft-com:vml" xmlns:pvml="urn:schemas-microsoft-com:office:powerpoint" xmlns:com="http://schemas.openxmlformats.org/drawingml/2006/compatibility" xmlns:p14="http://schemas.microsoft.com/office/powerpoint/2010/main" xmlns:p15="http://schemas.microsoft.com/office/powerpoint/2012/main" xmlns:ahyp="http://schemas.microsoft.com/office/drawing/2018/hyperlinkcolor" showMasterPhAnim="0" showMasterSp="0">
+  <p:cSld>
+    <p:spTree>
+      <p:nvGrpSpPr>
+        <p:cNvPr id="152" name="Shape 152"/>
+        <p:cNvGrpSpPr/>
+        <p:nvPr/>
+      </p:nvGrpSpPr>
+      <p:grpSpPr>
+        <a:xfrm>
+          <a:off x="0" y="0"/>
+          <a:ext cx="0" cy="0"/>
+          <a:chOff x="0" y="0"/>
+          <a:chExt cx="0" cy="0"/>
+        </a:xfrm>
+      </p:grpSpPr>
+      <p:sp>
+        <p:nvSpPr>
+          <p:cNvPr id="153" name="Google Shape;153;g3a9018bbb98_0_27:notes"/>
+          <p:cNvSpPr/>
+          <p:nvPr>
+            <p:ph idx="2" type="sldImg"/>
+          </p:nvPr>
+        </p:nvSpPr>
+        <p:spPr>
+          <a:xfrm>
+            <a:off x="381300" y="685800"/>
+            <a:ext cx="6096000" cy="3429000"/>
+          </a:xfrm>
+          <a:custGeom>
+            <a:rect b="b" l="l" r="r" t="t"/>
+            <a:pathLst>
+              <a:path extrusionOk="0" h="120000" w="120000">
+                <a:moveTo>
+                  <a:pt x="0" y="0"/>
+                </a:moveTo>
+                <a:lnTo>
+                  <a:pt x="120000" y="0"/>
+                </a:lnTo>
+                <a:lnTo>
+                  <a:pt x="120000" y="120000"/>
+                </a:lnTo>
+                <a:lnTo>
+                  <a:pt x="0" y="120000"/>
+                </a:lnTo>
+                <a:close/>
+              </a:path>
+            </a:pathLst>
+          </a:custGeom>
+        </p:spPr>
+      </p:sp>
+      <p:sp>
+        <p:nvSpPr>
+          <p:cNvPr id="154" name="Google Shape;154;g3a9018bbb98_0_27:notes"/>
+          <p:cNvSpPr txBox="1"/>
+          <p:nvPr>
+            <p:ph idx="1" type="body"/>
+          </p:nvPr>
+        </p:nvSpPr>
+        <p:spPr>
+          <a:xfrm>
+            <a:off x="685800" y="4343400"/>
+            <a:ext cx="5486400" cy="4114800"/>
+          </a:xfrm>
+          <a:prstGeom prst="rect">
+            <a:avLst/>
+          </a:prstGeom>
+        </p:spPr>
+        <p:txBody>
+          <a:bodyPr anchorCtr="0" anchor="t" bIns="91425" lIns="91425" spcFirstLastPara="1" rIns="91425" wrap="square" tIns="91425">
+            <a:noAutofit/>
+          </a:bodyPr>
+          <a:lstStyle/>
+          <a:p>
+            <a:pPr indent="0" lvl="0" marL="0" rtl="0" algn="l">
+              <a:spcBef>
+                <a:spcPts val="0"/>
+              </a:spcBef>
+              <a:spcAft>
+                <a:spcPts val="0"/>
+              </a:spcAft>
+              <a:buNone/>
+            </a:pPr>
+            <a:r>
+              <a:t/>
+            </a:r>
+            <a:endParaRPr/>
+          </a:p>
+        </p:txBody>
+      </p:sp>
+    </p:spTree>
+  </p:cSld>
+  <p:clrMapOvr>
+    <a:masterClrMapping/>
+  </p:clrMapOvr>
+</p:notes>
+</file>
+
+<file path=ppt/notesSlides/notesSlide9.xml><?xml version="1.0" encoding="utf-8"?>
+<p:notes xmlns:a="http://schemas.openxmlformats.org/drawingml/2006/main" xmlns:r="http://schemas.openxmlformats.org/officeDocument/2006/relationships" xmlns:mc="http://schemas.openxmlformats.org/markup-compatibility/2006" xmlns:mv="urn:schemas-microsoft-com:mac:vml" xmlns:p="http://schemas.openxmlformats.org/presentationml/2006/main" xmlns:c="http://schemas.openxmlformats.org/drawingml/2006/chart" xmlns:dgm="http://schemas.openxmlformats.org/drawingml/2006/diagram" xmlns:o="urn:schemas-microsoft-com:office:office" xmlns:v="urn:schemas-microsoft-com:vml" xmlns:pvml="urn:schemas-microsoft-com:office:powerpoint" xmlns:com="http://schemas.openxmlformats.org/drawingml/2006/compatibility" xmlns:p14="http://schemas.microsoft.com/office/powerpoint/2010/main" xmlns:p15="http://schemas.microsoft.com/office/powerpoint/2012/main" xmlns:ahyp="http://schemas.microsoft.com/office/drawing/2018/hyperlinkcolor" showMasterPhAnim="0" showMasterSp="0">
+  <p:cSld>
+    <p:spTree>
+      <p:nvGrpSpPr>
+        <p:cNvPr id="159" name="Shape 159"/>
+        <p:cNvGrpSpPr/>
+        <p:nvPr/>
+      </p:nvGrpSpPr>
+      <p:grpSpPr>
+        <a:xfrm>
+          <a:off x="0" y="0"/>
+          <a:ext cx="0" cy="0"/>
+          <a:chOff x="0" y="0"/>
+          <a:chExt cx="0" cy="0"/>
+        </a:xfrm>
+      </p:grpSpPr>
+      <p:sp>
+        <p:nvSpPr>
+          <p:cNvPr id="160" name="Google Shape;160;g3a9018bbb98_0_33:notes"/>
+          <p:cNvSpPr/>
+          <p:nvPr>
+            <p:ph idx="2" type="sldImg"/>
+          </p:nvPr>
+        </p:nvSpPr>
+        <p:spPr>
+          <a:xfrm>
+            <a:off x="381300" y="685800"/>
+            <a:ext cx="6096000" cy="3429000"/>
+          </a:xfrm>
+          <a:custGeom>
+            <a:rect b="b" l="l" r="r" t="t"/>
+            <a:pathLst>
+              <a:path extrusionOk="0" h="120000" w="120000">
+                <a:moveTo>
+                  <a:pt x="0" y="0"/>
+                </a:moveTo>
+                <a:lnTo>
+                  <a:pt x="120000" y="0"/>
+                </a:lnTo>
+                <a:lnTo>
+                  <a:pt x="120000" y="120000"/>
+                </a:lnTo>
+                <a:lnTo>
+                  <a:pt x="0" y="120000"/>
+                </a:lnTo>
+                <a:close/>
+              </a:path>
+            </a:pathLst>
+          </a:custGeom>
+        </p:spPr>
+      </p:sp>
+      <p:sp>
+        <p:nvSpPr>
+          <p:cNvPr id="161" name="Google Shape;161;g3a9018bbb98_0_33:notes"/>
           <p:cNvSpPr txBox="1"/>
           <p:nvPr>
             <p:ph idx="1" type="body"/>
@@ -11039,6 +11739,538 @@
 </p:sld>
 </file>
 
+<file path=ppt/slides/slide10.xml><?xml version="1.0" encoding="utf-8"?>
+<p:sld xmlns:a="http://schemas.openxmlformats.org/drawingml/2006/main" xmlns:r="http://schemas.openxmlformats.org/officeDocument/2006/relationships" xmlns:mc="http://schemas.openxmlformats.org/markup-compatibility/2006" xmlns:mv="urn:schemas-microsoft-com:mac:vml" xmlns:p="http://schemas.openxmlformats.org/presentationml/2006/main" xmlns:c="http://schemas.openxmlformats.org/drawingml/2006/chart" xmlns:dgm="http://schemas.openxmlformats.org/drawingml/2006/diagram" xmlns:o="urn:schemas-microsoft-com:office:office" xmlns:v="urn:schemas-microsoft-com:vml" xmlns:pvml="urn:schemas-microsoft-com:office:powerpoint" xmlns:com="http://schemas.openxmlformats.org/drawingml/2006/compatibility" xmlns:p14="http://schemas.microsoft.com/office/powerpoint/2010/main" xmlns:p15="http://schemas.microsoft.com/office/powerpoint/2012/main" xmlns:ahyp="http://schemas.microsoft.com/office/drawing/2018/hyperlinkcolor">
+  <p:cSld>
+    <p:spTree>
+      <p:nvGrpSpPr>
+        <p:cNvPr id="169" name="Shape 169"/>
+        <p:cNvGrpSpPr/>
+        <p:nvPr/>
+      </p:nvGrpSpPr>
+      <p:grpSpPr>
+        <a:xfrm>
+          <a:off x="0" y="0"/>
+          <a:ext cx="0" cy="0"/>
+          <a:chOff x="0" y="0"/>
+          <a:chExt cx="0" cy="0"/>
+        </a:xfrm>
+      </p:grpSpPr>
+      <p:sp>
+        <p:nvSpPr>
+          <p:cNvPr id="170" name="Google Shape;170;p22"/>
+          <p:cNvSpPr txBox="1"/>
+          <p:nvPr>
+            <p:ph type="title"/>
+          </p:nvPr>
+        </p:nvSpPr>
+        <p:spPr>
+          <a:xfrm>
+            <a:off x="685800" y="307965"/>
+            <a:ext cx="16916400" cy="1509000"/>
+          </a:xfrm>
+          <a:prstGeom prst="rect">
+            <a:avLst/>
+          </a:prstGeom>
+        </p:spPr>
+        <p:txBody>
+          <a:bodyPr anchorCtr="0" anchor="ctr" bIns="0" lIns="0" spcFirstLastPara="1" rIns="0" wrap="square" tIns="0">
+            <a:noAutofit/>
+          </a:bodyPr>
+          <a:lstStyle/>
+          <a:p>
+            <a:pPr indent="0" lvl="0" marL="0" rtl="0" algn="l">
+              <a:spcBef>
+                <a:spcPts val="0"/>
+              </a:spcBef>
+              <a:spcAft>
+                <a:spcPts val="0"/>
+              </a:spcAft>
+              <a:buNone/>
+            </a:pPr>
+            <a:r>
+              <a:rPr lang="en"/>
+              <a:t>Mean of sleep quality by occupation</a:t>
+            </a:r>
+            <a:endParaRPr/>
+          </a:p>
+        </p:txBody>
+      </p:sp>
+      <p:pic>
+        <p:nvPicPr>
+          <p:cNvPr id="171" name="Google Shape;171;p22" title="Gráfico"/>
+          <p:cNvPicPr preferRelativeResize="0"/>
+          <p:nvPr/>
+        </p:nvPicPr>
+        <p:blipFill>
+          <a:blip r:embed="rId3">
+            <a:alphaModFix/>
+          </a:blip>
+          <a:stretch>
+            <a:fillRect/>
+          </a:stretch>
+        </p:blipFill>
+        <p:spPr>
+          <a:xfrm>
+            <a:off x="3972876" y="1932063"/>
+            <a:ext cx="10342249" cy="6422874"/>
+          </a:xfrm>
+          <a:prstGeom prst="rect">
+            <a:avLst/>
+          </a:prstGeom>
+          <a:noFill/>
+          <a:ln>
+            <a:noFill/>
+          </a:ln>
+        </p:spPr>
+      </p:pic>
+    </p:spTree>
+  </p:cSld>
+  <p:clrMapOvr>
+    <a:masterClrMapping/>
+  </p:clrMapOvr>
+</p:sld>
+</file>
+
+<file path=ppt/slides/slide11.xml><?xml version="1.0" encoding="utf-8"?>
+<p:sld xmlns:a="http://schemas.openxmlformats.org/drawingml/2006/main" xmlns:r="http://schemas.openxmlformats.org/officeDocument/2006/relationships" xmlns:mc="http://schemas.openxmlformats.org/markup-compatibility/2006" xmlns:mv="urn:schemas-microsoft-com:mac:vml" xmlns:p="http://schemas.openxmlformats.org/presentationml/2006/main" xmlns:c="http://schemas.openxmlformats.org/drawingml/2006/chart" xmlns:dgm="http://schemas.openxmlformats.org/drawingml/2006/diagram" xmlns:o="urn:schemas-microsoft-com:office:office" xmlns:v="urn:schemas-microsoft-com:vml" xmlns:pvml="urn:schemas-microsoft-com:office:powerpoint" xmlns:com="http://schemas.openxmlformats.org/drawingml/2006/compatibility" xmlns:p14="http://schemas.microsoft.com/office/powerpoint/2010/main" xmlns:p15="http://schemas.microsoft.com/office/powerpoint/2012/main" xmlns:ahyp="http://schemas.microsoft.com/office/drawing/2018/hyperlinkcolor">
+  <p:cSld>
+    <p:spTree>
+      <p:nvGrpSpPr>
+        <p:cNvPr id="175" name="Shape 175"/>
+        <p:cNvGrpSpPr/>
+        <p:nvPr/>
+      </p:nvGrpSpPr>
+      <p:grpSpPr>
+        <a:xfrm>
+          <a:off x="0" y="0"/>
+          <a:ext cx="0" cy="0"/>
+          <a:chOff x="0" y="0"/>
+          <a:chExt cx="0" cy="0"/>
+        </a:xfrm>
+      </p:grpSpPr>
+      <p:sp>
+        <p:nvSpPr>
+          <p:cNvPr id="176" name="Google Shape;176;p23"/>
+          <p:cNvSpPr txBox="1"/>
+          <p:nvPr>
+            <p:ph type="title"/>
+          </p:nvPr>
+        </p:nvSpPr>
+        <p:spPr>
+          <a:xfrm>
+            <a:off x="685800" y="307965"/>
+            <a:ext cx="16916400" cy="1509000"/>
+          </a:xfrm>
+          <a:prstGeom prst="rect">
+            <a:avLst/>
+          </a:prstGeom>
+        </p:spPr>
+        <p:txBody>
+          <a:bodyPr anchorCtr="0" anchor="ctr" bIns="0" lIns="0" spcFirstLastPara="1" rIns="0" wrap="square" tIns="0">
+            <a:noAutofit/>
+          </a:bodyPr>
+          <a:lstStyle/>
+          <a:p>
+            <a:pPr indent="0" lvl="0" marL="0" rtl="0" algn="l">
+              <a:spcBef>
+                <a:spcPts val="0"/>
+              </a:spcBef>
+              <a:spcAft>
+                <a:spcPts val="0"/>
+              </a:spcAft>
+              <a:buNone/>
+            </a:pPr>
+            <a:r>
+              <a:rPr lang="en"/>
+              <a:t>People who exercise tend to sleep better</a:t>
+            </a:r>
+            <a:endParaRPr/>
+          </a:p>
+        </p:txBody>
+      </p:sp>
+      <p:sp>
+        <p:nvSpPr>
+          <p:cNvPr id="177" name="Google Shape;177;p23"/>
+          <p:cNvSpPr txBox="1"/>
+          <p:nvPr>
+            <p:ph idx="1" type="body"/>
+          </p:nvPr>
+        </p:nvSpPr>
+        <p:spPr>
+          <a:xfrm>
+            <a:off x="685825" y="1828800"/>
+            <a:ext cx="16916400" cy="6629400"/>
+          </a:xfrm>
+          <a:prstGeom prst="rect">
+            <a:avLst/>
+          </a:prstGeom>
+          <a:effectLst>
+            <a:outerShdw blurRad="57150" rotWithShape="0" algn="bl" dir="5400000" dist="19050">
+              <a:srgbClr val="000000">
+                <a:alpha val="50000"/>
+              </a:srgbClr>
+            </a:outerShdw>
+            <a:reflection blurRad="0" dir="5400000" dist="38100" endA="0" fadeDir="5400012" kx="0" rotWithShape="0" algn="bl" stPos="0" sy="-100000" ky="0"/>
+          </a:effectLst>
+        </p:spPr>
+        <p:txBody>
+          <a:bodyPr anchorCtr="0" anchor="t" bIns="0" lIns="0" spcFirstLastPara="1" rIns="0" wrap="square" tIns="0">
+            <a:noAutofit/>
+          </a:bodyPr>
+          <a:lstStyle/>
+          <a:p>
+            <a:pPr indent="-609600" lvl="0" marL="914400" rtl="0" algn="l">
+              <a:lnSpc>
+                <a:spcPct val="100000"/>
+              </a:lnSpc>
+              <a:spcBef>
+                <a:spcPts val="1400"/>
+              </a:spcBef>
+              <a:spcAft>
+                <a:spcPts val="0"/>
+              </a:spcAft>
+              <a:buClr>
+                <a:schemeClr val="dk1"/>
+              </a:buClr>
+              <a:buSzPts val="2400"/>
+              <a:buFont typeface="Arial"/>
+              <a:buChar char="●"/>
+            </a:pPr>
+            <a:r>
+              <a:rPr lang="en" sz="2400">
+                <a:solidFill>
+                  <a:srgbClr val="2D3D4A"/>
+                </a:solidFill>
+                <a:latin typeface="Arial"/>
+                <a:ea typeface="Arial"/>
+                <a:cs typeface="Arial"/>
+                <a:sym typeface="Arial"/>
+              </a:rPr>
+              <a:t>We can a very weak positive correlation between physical </a:t>
+            </a:r>
+            <a:r>
+              <a:rPr lang="en" sz="2400">
+                <a:solidFill>
+                  <a:srgbClr val="2D3D4A"/>
+                </a:solidFill>
+                <a:latin typeface="Arial"/>
+                <a:ea typeface="Arial"/>
+                <a:cs typeface="Arial"/>
+                <a:sym typeface="Arial"/>
+              </a:rPr>
+              <a:t>activity</a:t>
+            </a:r>
+            <a:r>
+              <a:rPr lang="en" sz="2400">
+                <a:solidFill>
+                  <a:srgbClr val="2D3D4A"/>
+                </a:solidFill>
+                <a:latin typeface="Arial"/>
+                <a:ea typeface="Arial"/>
+                <a:cs typeface="Arial"/>
+                <a:sym typeface="Arial"/>
+              </a:rPr>
+              <a:t> level and sleep quality</a:t>
+            </a:r>
+            <a:endParaRPr sz="2400">
+              <a:latin typeface="Arial"/>
+              <a:ea typeface="Arial"/>
+              <a:cs typeface="Arial"/>
+              <a:sym typeface="Arial"/>
+            </a:endParaRPr>
+          </a:p>
+        </p:txBody>
+      </p:sp>
+      <p:pic>
+        <p:nvPicPr>
+          <p:cNvPr id="178" name="Google Shape;178;p23" title="Gráfico"/>
+          <p:cNvPicPr preferRelativeResize="0"/>
+          <p:nvPr/>
+        </p:nvPicPr>
+        <p:blipFill>
+          <a:blip r:embed="rId3">
+            <a:alphaModFix/>
+          </a:blip>
+          <a:stretch>
+            <a:fillRect/>
+          </a:stretch>
+        </p:blipFill>
+        <p:spPr>
+          <a:xfrm>
+            <a:off x="4117488" y="2274800"/>
+            <a:ext cx="10053026" cy="6243275"/>
+          </a:xfrm>
+          <a:prstGeom prst="rect">
+            <a:avLst/>
+          </a:prstGeom>
+          <a:noFill/>
+          <a:ln>
+            <a:noFill/>
+          </a:ln>
+        </p:spPr>
+      </p:pic>
+    </p:spTree>
+  </p:cSld>
+  <p:clrMapOvr>
+    <a:masterClrMapping/>
+  </p:clrMapOvr>
+</p:sld>
+</file>
+
+<file path=ppt/slides/slide12.xml><?xml version="1.0" encoding="utf-8"?>
+<p:sld xmlns:a="http://schemas.openxmlformats.org/drawingml/2006/main" xmlns:r="http://schemas.openxmlformats.org/officeDocument/2006/relationships" xmlns:mc="http://schemas.openxmlformats.org/markup-compatibility/2006" xmlns:mv="urn:schemas-microsoft-com:mac:vml" xmlns:p="http://schemas.openxmlformats.org/presentationml/2006/main" xmlns:c="http://schemas.openxmlformats.org/drawingml/2006/chart" xmlns:dgm="http://schemas.openxmlformats.org/drawingml/2006/diagram" xmlns:o="urn:schemas-microsoft-com:office:office" xmlns:v="urn:schemas-microsoft-com:vml" xmlns:pvml="urn:schemas-microsoft-com:office:powerpoint" xmlns:com="http://schemas.openxmlformats.org/drawingml/2006/compatibility" xmlns:p14="http://schemas.microsoft.com/office/powerpoint/2010/main" xmlns:p15="http://schemas.microsoft.com/office/powerpoint/2012/main" xmlns:ahyp="http://schemas.microsoft.com/office/drawing/2018/hyperlinkcolor">
+  <p:cSld>
+    <p:spTree>
+      <p:nvGrpSpPr>
+        <p:cNvPr id="182" name="Shape 182"/>
+        <p:cNvGrpSpPr/>
+        <p:nvPr/>
+      </p:nvGrpSpPr>
+      <p:grpSpPr>
+        <a:xfrm>
+          <a:off x="0" y="0"/>
+          <a:ext cx="0" cy="0"/>
+          <a:chOff x="0" y="0"/>
+          <a:chExt cx="0" cy="0"/>
+        </a:xfrm>
+      </p:grpSpPr>
+      <p:sp>
+        <p:nvSpPr>
+          <p:cNvPr id="183" name="Google Shape;183;p24"/>
+          <p:cNvSpPr txBox="1"/>
+          <p:nvPr>
+            <p:ph type="title"/>
+          </p:nvPr>
+        </p:nvSpPr>
+        <p:spPr>
+          <a:xfrm>
+            <a:off x="685800" y="307965"/>
+            <a:ext cx="16916400" cy="1509000"/>
+          </a:xfrm>
+          <a:prstGeom prst="rect">
+            <a:avLst/>
+          </a:prstGeom>
+        </p:spPr>
+        <p:txBody>
+          <a:bodyPr anchorCtr="0" anchor="ctr" bIns="0" lIns="0" spcFirstLastPara="1" rIns="0" wrap="square" tIns="0">
+            <a:noAutofit/>
+          </a:bodyPr>
+          <a:lstStyle/>
+          <a:p>
+            <a:pPr indent="0" lvl="0" marL="0" rtl="0" algn="l">
+              <a:spcBef>
+                <a:spcPts val="0"/>
+              </a:spcBef>
+              <a:spcAft>
+                <a:spcPts val="0"/>
+              </a:spcAft>
+              <a:buNone/>
+            </a:pPr>
+            <a:r>
+              <a:rPr lang="en"/>
+              <a:t>Calm down to get your rest</a:t>
+            </a:r>
+            <a:endParaRPr/>
+          </a:p>
+        </p:txBody>
+      </p:sp>
+      <p:sp>
+        <p:nvSpPr>
+          <p:cNvPr id="184" name="Google Shape;184;p24"/>
+          <p:cNvSpPr txBox="1"/>
+          <p:nvPr>
+            <p:ph idx="1" type="body"/>
+          </p:nvPr>
+        </p:nvSpPr>
+        <p:spPr>
+          <a:xfrm>
+            <a:off x="685825" y="1828800"/>
+            <a:ext cx="16916400" cy="6629400"/>
+          </a:xfrm>
+          <a:prstGeom prst="rect">
+            <a:avLst/>
+          </a:prstGeom>
+        </p:spPr>
+        <p:txBody>
+          <a:bodyPr anchorCtr="0" anchor="t" bIns="0" lIns="0" spcFirstLastPara="1" rIns="0" wrap="square" tIns="0">
+            <a:noAutofit/>
+          </a:bodyPr>
+          <a:lstStyle/>
+          <a:p>
+            <a:pPr indent="-685800" lvl="0" marL="914400" rtl="0" algn="l">
+              <a:lnSpc>
+                <a:spcPct val="100000"/>
+              </a:lnSpc>
+              <a:spcBef>
+                <a:spcPts val="0"/>
+              </a:spcBef>
+              <a:spcAft>
+                <a:spcPts val="0"/>
+              </a:spcAft>
+              <a:buClr>
+                <a:schemeClr val="dk1"/>
+              </a:buClr>
+              <a:buSzPts val="3600"/>
+              <a:buChar char="●"/>
+            </a:pPr>
+            <a:r>
+              <a:rPr lang="en">
+                <a:latin typeface="Open Sans Light"/>
+                <a:ea typeface="Open Sans Light"/>
+                <a:cs typeface="Open Sans Light"/>
+                <a:sym typeface="Open Sans Light"/>
+              </a:rPr>
+              <a:t>Stress tend to make your sleep quality worse</a:t>
+            </a:r>
+            <a:endParaRPr/>
+          </a:p>
+          <a:p>
+            <a:pPr indent="0" lvl="0" marL="0" rtl="0" algn="l">
+              <a:spcBef>
+                <a:spcPts val="0"/>
+              </a:spcBef>
+              <a:spcAft>
+                <a:spcPts val="2000"/>
+              </a:spcAft>
+              <a:buNone/>
+            </a:pPr>
+            <a:r>
+              <a:t/>
+            </a:r>
+            <a:endParaRPr/>
+          </a:p>
+        </p:txBody>
+      </p:sp>
+      <p:pic>
+        <p:nvPicPr>
+          <p:cNvPr id="185" name="Google Shape;185;p24" title="Gráfico"/>
+          <p:cNvPicPr preferRelativeResize="0"/>
+          <p:nvPr/>
+        </p:nvPicPr>
+        <p:blipFill>
+          <a:blip r:embed="rId3">
+            <a:alphaModFix/>
+          </a:blip>
+          <a:stretch>
+            <a:fillRect/>
+          </a:stretch>
+        </p:blipFill>
+        <p:spPr>
+          <a:xfrm>
+            <a:off x="4253363" y="2383698"/>
+            <a:ext cx="9781277" cy="6074501"/>
+          </a:xfrm>
+          <a:prstGeom prst="rect">
+            <a:avLst/>
+          </a:prstGeom>
+          <a:noFill/>
+          <a:ln>
+            <a:noFill/>
+          </a:ln>
+        </p:spPr>
+      </p:pic>
+    </p:spTree>
+  </p:cSld>
+  <p:clrMapOvr>
+    <a:masterClrMapping/>
+  </p:clrMapOvr>
+</p:sld>
+</file>
+
+<file path=ppt/slides/slide13.xml><?xml version="1.0" encoding="utf-8"?>
+<p:sld xmlns:a="http://schemas.openxmlformats.org/drawingml/2006/main" xmlns:r="http://schemas.openxmlformats.org/officeDocument/2006/relationships" xmlns:mc="http://schemas.openxmlformats.org/markup-compatibility/2006" xmlns:mv="urn:schemas-microsoft-com:mac:vml" xmlns:p="http://schemas.openxmlformats.org/presentationml/2006/main" xmlns:c="http://schemas.openxmlformats.org/drawingml/2006/chart" xmlns:dgm="http://schemas.openxmlformats.org/drawingml/2006/diagram" xmlns:o="urn:schemas-microsoft-com:office:office" xmlns:v="urn:schemas-microsoft-com:vml" xmlns:pvml="urn:schemas-microsoft-com:office:powerpoint" xmlns:com="http://schemas.openxmlformats.org/drawingml/2006/compatibility" xmlns:p14="http://schemas.microsoft.com/office/powerpoint/2010/main" xmlns:p15="http://schemas.microsoft.com/office/powerpoint/2012/main" xmlns:ahyp="http://schemas.microsoft.com/office/drawing/2018/hyperlinkcolor">
+  <p:cSld>
+    <p:spTree>
+      <p:nvGrpSpPr>
+        <p:cNvPr id="189" name="Shape 189"/>
+        <p:cNvGrpSpPr/>
+        <p:nvPr/>
+      </p:nvGrpSpPr>
+      <p:grpSpPr>
+        <a:xfrm>
+          <a:off x="0" y="0"/>
+          <a:ext cx="0" cy="0"/>
+          <a:chOff x="0" y="0"/>
+          <a:chExt cx="0" cy="0"/>
+        </a:xfrm>
+      </p:grpSpPr>
+      <p:sp>
+        <p:nvSpPr>
+          <p:cNvPr id="190" name="Google Shape;190;p25"/>
+          <p:cNvSpPr txBox="1"/>
+          <p:nvPr>
+            <p:ph type="title"/>
+          </p:nvPr>
+        </p:nvSpPr>
+        <p:spPr>
+          <a:xfrm>
+            <a:off x="685800" y="307965"/>
+            <a:ext cx="16916400" cy="1509000"/>
+          </a:xfrm>
+          <a:prstGeom prst="rect">
+            <a:avLst/>
+          </a:prstGeom>
+        </p:spPr>
+        <p:txBody>
+          <a:bodyPr anchorCtr="0" anchor="ctr" bIns="0" lIns="0" spcFirstLastPara="1" rIns="0" wrap="square" tIns="0">
+            <a:noAutofit/>
+          </a:bodyPr>
+          <a:lstStyle/>
+          <a:p>
+            <a:pPr indent="0" lvl="0" marL="0" rtl="0" algn="l">
+              <a:spcBef>
+                <a:spcPts val="0"/>
+              </a:spcBef>
+              <a:spcAft>
+                <a:spcPts val="0"/>
+              </a:spcAft>
+              <a:buNone/>
+            </a:pPr>
+            <a:r>
+              <a:rPr lang="en"/>
+              <a:t>Average Sleep Quality by BMI</a:t>
+            </a:r>
+            <a:endParaRPr/>
+          </a:p>
+        </p:txBody>
+      </p:sp>
+      <p:pic>
+        <p:nvPicPr>
+          <p:cNvPr id="191" name="Google Shape;191;p25" title="Gráfico"/>
+          <p:cNvPicPr preferRelativeResize="0"/>
+          <p:nvPr/>
+        </p:nvPicPr>
+        <p:blipFill>
+          <a:blip r:embed="rId3">
+            <a:alphaModFix/>
+          </a:blip>
+          <a:stretch>
+            <a:fillRect/>
+          </a:stretch>
+        </p:blipFill>
+        <p:spPr>
+          <a:xfrm>
+            <a:off x="4229250" y="2353775"/>
+            <a:ext cx="9829492" cy="6104425"/>
+          </a:xfrm>
+          <a:prstGeom prst="rect">
+            <a:avLst/>
+          </a:prstGeom>
+          <a:noFill/>
+          <a:ln>
+            <a:noFill/>
+          </a:ln>
+        </p:spPr>
+      </p:pic>
+    </p:spTree>
+  </p:cSld>
+  <p:clrMapOvr>
+    <a:masterClrMapping/>
+  </p:clrMapOvr>
+</p:sld>
+</file>
+
 <file path=ppt/slides/slide2.xml><?xml version="1.0" encoding="utf-8"?>
 <p:sld xmlns:a="http://schemas.openxmlformats.org/drawingml/2006/main" xmlns:r="http://schemas.openxmlformats.org/officeDocument/2006/relationships" xmlns:mc="http://schemas.openxmlformats.org/markup-compatibility/2006" xmlns:mv="urn:schemas-microsoft-com:mac:vml" xmlns:p="http://schemas.openxmlformats.org/presentationml/2006/main" xmlns:c="http://schemas.openxmlformats.org/drawingml/2006/chart" xmlns:dgm="http://schemas.openxmlformats.org/drawingml/2006/diagram" xmlns:o="urn:schemas-microsoft-com:office:office" xmlns:v="urn:schemas-microsoft-com:vml" xmlns:pvml="urn:schemas-microsoft-com:office:powerpoint" xmlns:com="http://schemas.openxmlformats.org/drawingml/2006/compatibility" xmlns:p14="http://schemas.microsoft.com/office/powerpoint/2010/main" xmlns:p15="http://schemas.microsoft.com/office/powerpoint/2012/main" xmlns:ahyp="http://schemas.microsoft.com/office/drawing/2018/hyperlinkcolor">
   <p:cSld>
@@ -11558,7 +12790,7 @@
             <a:tbl>
               <a:tblPr>
                 <a:noFill/>
-                <a:tableStyleId>{E822BDFB-ECFC-4B64-8A61-EBD32C3CBA17}</a:tableStyleId>
+                <a:tableStyleId>{8D5190F1-66B9-4BCA-BBC9-C93BD36A8C76}</a:tableStyleId>
               </a:tblPr>
               <a:tblGrid>
                 <a:gridCol w="4672325"/>
@@ -12046,7 +13278,7 @@
             <a:tbl>
               <a:tblPr>
                 <a:noFill/>
-                <a:tableStyleId>{5BD02171-B227-4CA5-AF1E-6B304A8C844E}</a:tableStyleId>
+                <a:tableStyleId>{1E3FA2CE-8FE4-4662-8D70-E649B1241357}</a:tableStyleId>
               </a:tblPr>
               <a:tblGrid>
                 <a:gridCol w="3953575"/>
@@ -14302,15 +15534,15 @@
         </p:nvSpPr>
         <p:spPr>
           <a:xfrm>
-            <a:off x="685800" y="307965"/>
-            <a:ext cx="16916400" cy="1509000"/>
+            <a:off x="685800" y="307971"/>
+            <a:ext cx="16916400" cy="970500"/>
           </a:xfrm>
           <a:prstGeom prst="rect">
             <a:avLst/>
           </a:prstGeom>
         </p:spPr>
         <p:txBody>
-          <a:bodyPr anchorCtr="0" anchor="ctr" bIns="0" lIns="0" spcFirstLastPara="1" rIns="0" wrap="square" tIns="0">
+          <a:bodyPr anchorCtr="0" anchor="t" bIns="0" lIns="0" spcFirstLastPara="1" rIns="0" wrap="square" tIns="0">
             <a:noAutofit/>
           </a:bodyPr>
           <a:lstStyle/>
@@ -14342,8 +15574,8 @@
         </p:nvSpPr>
         <p:spPr>
           <a:xfrm>
-            <a:off x="685825" y="1828800"/>
-            <a:ext cx="16916400" cy="6629400"/>
+            <a:off x="685850" y="1314450"/>
+            <a:ext cx="16916400" cy="7315200"/>
           </a:xfrm>
           <a:prstGeom prst="rect">
             <a:avLst/>
@@ -14360,13 +15592,119 @@
                 <a:spcPts val="0"/>
               </a:spcBef>
               <a:spcAft>
-                <a:spcPts val="2000"/>
+                <a:spcPts val="0"/>
               </a:spcAft>
               <a:buNone/>
             </a:pPr>
             <a:r>
               <a:rPr lang="en"/>
               <a:t>View of the Heart Rate Distribution</a:t>
+            </a:r>
+            <a:endParaRPr/>
+          </a:p>
+          <a:p>
+            <a:pPr indent="0" lvl="0" marL="0" rtl="0" algn="l">
+              <a:spcBef>
+                <a:spcPts val="2000"/>
+              </a:spcBef>
+              <a:spcAft>
+                <a:spcPts val="0"/>
+              </a:spcAft>
+              <a:buNone/>
+            </a:pPr>
+            <a:r>
+              <a:t/>
+            </a:r>
+            <a:endParaRPr/>
+          </a:p>
+          <a:p>
+            <a:pPr indent="0" lvl="0" marL="0" rtl="0" algn="l">
+              <a:spcBef>
+                <a:spcPts val="2000"/>
+              </a:spcBef>
+              <a:spcAft>
+                <a:spcPts val="0"/>
+              </a:spcAft>
+              <a:buNone/>
+            </a:pPr>
+            <a:r>
+              <a:t/>
+            </a:r>
+            <a:endParaRPr/>
+          </a:p>
+          <a:p>
+            <a:pPr indent="0" lvl="0" marL="0" rtl="0" algn="l">
+              <a:spcBef>
+                <a:spcPts val="2000"/>
+              </a:spcBef>
+              <a:spcAft>
+                <a:spcPts val="0"/>
+              </a:spcAft>
+              <a:buNone/>
+            </a:pPr>
+            <a:r>
+              <a:t/>
+            </a:r>
+            <a:endParaRPr/>
+          </a:p>
+          <a:p>
+            <a:pPr indent="0" lvl="0" marL="0" rtl="0" algn="l">
+              <a:spcBef>
+                <a:spcPts val="2000"/>
+              </a:spcBef>
+              <a:spcAft>
+                <a:spcPts val="0"/>
+              </a:spcAft>
+              <a:buNone/>
+            </a:pPr>
+            <a:r>
+              <a:t/>
+            </a:r>
+            <a:endParaRPr/>
+          </a:p>
+          <a:p>
+            <a:pPr indent="0" lvl="0" marL="0" rtl="0" algn="l">
+              <a:spcBef>
+                <a:spcPts val="2000"/>
+              </a:spcBef>
+              <a:spcAft>
+                <a:spcPts val="0"/>
+              </a:spcAft>
+              <a:buNone/>
+            </a:pPr>
+            <a:r>
+              <a:t/>
+            </a:r>
+            <a:endParaRPr/>
+          </a:p>
+          <a:p>
+            <a:pPr indent="0" lvl="0" marL="0" rtl="0" algn="l">
+              <a:spcBef>
+                <a:spcPts val="2000"/>
+              </a:spcBef>
+              <a:spcAft>
+                <a:spcPts val="0"/>
+              </a:spcAft>
+              <a:buNone/>
+            </a:pPr>
+            <a:r>
+              <a:t/>
+            </a:r>
+            <a:endParaRPr/>
+          </a:p>
+          <a:p>
+            <a:pPr indent="0" lvl="0" marL="0" rtl="0" algn="l">
+              <a:spcBef>
+                <a:spcPts val="2000"/>
+              </a:spcBef>
+              <a:spcAft>
+                <a:spcPts val="2000"/>
+              </a:spcAft>
+              <a:buNone/>
+            </a:pPr>
+            <a:r>
+              <a:rPr lang="en"/>
+              <a:t>Heart Rate Mean: </a:t>
             </a:r>
             <a:endParaRPr/>
           </a:p>
@@ -14388,7 +15726,7 @@
         </p:blipFill>
         <p:spPr>
           <a:xfrm>
-            <a:off x="685800" y="2699100"/>
+            <a:off x="685875" y="1828800"/>
             <a:ext cx="9316500" cy="5759100"/>
           </a:xfrm>
           <a:prstGeom prst="snip1Rect">
@@ -14418,7 +15756,7 @@
         </p:blipFill>
         <p:spPr>
           <a:xfrm>
-            <a:off x="10488750" y="2699103"/>
+            <a:off x="10488825" y="1828803"/>
             <a:ext cx="7113300" cy="5759100"/>
           </a:xfrm>
           <a:prstGeom prst="snip2DiagRect">
@@ -14426,6 +15764,458 @@
               <a:gd fmla="val 10021" name="adj1"/>
               <a:gd fmla="val 0" name="adj2"/>
             </a:avLst>
+          </a:prstGeom>
+          <a:noFill/>
+          <a:ln>
+            <a:noFill/>
+          </a:ln>
+        </p:spPr>
+      </p:pic>
+    </p:spTree>
+  </p:cSld>
+  <p:clrMapOvr>
+    <a:masterClrMapping/>
+  </p:clrMapOvr>
+</p:sld>
+</file>
+
+<file path=ppt/slides/slide7.xml><?xml version="1.0" encoding="utf-8"?>
+<p:sld xmlns:a="http://schemas.openxmlformats.org/drawingml/2006/main" xmlns:r="http://schemas.openxmlformats.org/officeDocument/2006/relationships" xmlns:mc="http://schemas.openxmlformats.org/markup-compatibility/2006" xmlns:mv="urn:schemas-microsoft-com:mac:vml" xmlns:p="http://schemas.openxmlformats.org/presentationml/2006/main" xmlns:c="http://schemas.openxmlformats.org/drawingml/2006/chart" xmlns:dgm="http://schemas.openxmlformats.org/drawingml/2006/diagram" xmlns:o="urn:schemas-microsoft-com:office:office" xmlns:v="urn:schemas-microsoft-com:vml" xmlns:pvml="urn:schemas-microsoft-com:office:powerpoint" xmlns:com="http://schemas.openxmlformats.org/drawingml/2006/compatibility" xmlns:p14="http://schemas.microsoft.com/office/powerpoint/2010/main" xmlns:p15="http://schemas.microsoft.com/office/powerpoint/2012/main" xmlns:ahyp="http://schemas.microsoft.com/office/drawing/2018/hyperlinkcolor">
+  <p:cSld>
+    <p:spTree>
+      <p:nvGrpSpPr>
+        <p:cNvPr id="148" name="Shape 148"/>
+        <p:cNvGrpSpPr/>
+        <p:nvPr/>
+      </p:nvGrpSpPr>
+      <p:grpSpPr>
+        <a:xfrm>
+          <a:off x="0" y="0"/>
+          <a:ext cx="0" cy="0"/>
+          <a:chOff x="0" y="0"/>
+          <a:chExt cx="0" cy="0"/>
+        </a:xfrm>
+      </p:grpSpPr>
+      <p:sp>
+        <p:nvSpPr>
+          <p:cNvPr id="149" name="Google Shape;149;p19"/>
+          <p:cNvSpPr txBox="1"/>
+          <p:nvPr>
+            <p:ph idx="1" type="body"/>
+          </p:nvPr>
+        </p:nvSpPr>
+        <p:spPr>
+          <a:xfrm>
+            <a:off x="685800" y="1828800"/>
+            <a:ext cx="16393800" cy="6629400"/>
+          </a:xfrm>
+          <a:prstGeom prst="rect">
+            <a:avLst/>
+          </a:prstGeom>
+          <a:effectLst>
+            <a:outerShdw blurRad="57150" rotWithShape="0" algn="bl" dir="5400000" dist="19050">
+              <a:srgbClr val="000000">
+                <a:alpha val="50000"/>
+              </a:srgbClr>
+            </a:outerShdw>
+          </a:effectLst>
+        </p:spPr>
+        <p:txBody>
+          <a:bodyPr anchorCtr="0" anchor="t" bIns="0" lIns="0" spcFirstLastPara="1" rIns="0" wrap="square" tIns="0">
+            <a:noAutofit/>
+          </a:bodyPr>
+          <a:lstStyle/>
+          <a:p>
+            <a:pPr indent="-381000" lvl="0" marL="457200" marR="0" rtl="0" algn="l">
+              <a:lnSpc>
+                <a:spcPct val="100000"/>
+              </a:lnSpc>
+              <a:spcBef>
+                <a:spcPts val="0"/>
+              </a:spcBef>
+              <a:spcAft>
+                <a:spcPts val="0"/>
+              </a:spcAft>
+              <a:buSzPts val="2400"/>
+              <a:buFont typeface="Open Sans Light"/>
+              <a:buChar char="●"/>
+            </a:pPr>
+            <a:r>
+              <a:rPr lang="en" sz="2400">
+                <a:latin typeface="Open Sans Light"/>
+                <a:ea typeface="Open Sans Light"/>
+                <a:cs typeface="Open Sans Light"/>
+                <a:sym typeface="Open Sans Light"/>
+              </a:rPr>
+              <a:t>Woman, sleep better than man, in average.</a:t>
+            </a:r>
+            <a:endParaRPr sz="2400">
+              <a:latin typeface="Open Sans Light"/>
+              <a:ea typeface="Open Sans Light"/>
+              <a:cs typeface="Open Sans Light"/>
+              <a:sym typeface="Open Sans Light"/>
+            </a:endParaRPr>
+          </a:p>
+        </p:txBody>
+      </p:sp>
+      <p:sp>
+        <p:nvSpPr>
+          <p:cNvPr id="150" name="Google Shape;150;p19"/>
+          <p:cNvSpPr txBox="1"/>
+          <p:nvPr>
+            <p:ph type="title"/>
+          </p:nvPr>
+        </p:nvSpPr>
+        <p:spPr>
+          <a:xfrm>
+            <a:off x="685800" y="307965"/>
+            <a:ext cx="16916400" cy="1509000"/>
+          </a:xfrm>
+          <a:prstGeom prst="rect">
+            <a:avLst/>
+          </a:prstGeom>
+        </p:spPr>
+        <p:txBody>
+          <a:bodyPr anchorCtr="0" anchor="ctr" bIns="0" lIns="0" spcFirstLastPara="1" rIns="0" wrap="square" tIns="0">
+            <a:noAutofit/>
+          </a:bodyPr>
+          <a:lstStyle/>
+          <a:p>
+            <a:pPr indent="0" lvl="0" marL="0" rtl="0" algn="l">
+              <a:spcBef>
+                <a:spcPts val="0"/>
+              </a:spcBef>
+              <a:spcAft>
+                <a:spcPts val="0"/>
+              </a:spcAft>
+              <a:buNone/>
+            </a:pPr>
+            <a:r>
+              <a:rPr lang="en"/>
+              <a:t>Difference between Man and Woman sleep</a:t>
+            </a:r>
+            <a:endParaRPr/>
+          </a:p>
+        </p:txBody>
+      </p:sp>
+      <p:pic>
+        <p:nvPicPr>
+          <p:cNvPr id="151" name="Google Shape;151;p19" title="Gráfico"/>
+          <p:cNvPicPr preferRelativeResize="0"/>
+          <p:nvPr/>
+        </p:nvPicPr>
+        <p:blipFill>
+          <a:blip r:embed="rId3">
+            <a:alphaModFix/>
+          </a:blip>
+          <a:stretch>
+            <a:fillRect/>
+          </a:stretch>
+        </p:blipFill>
+        <p:spPr>
+          <a:xfrm>
+            <a:off x="4390450" y="2553975"/>
+            <a:ext cx="9507101" cy="5904225"/>
+          </a:xfrm>
+          <a:prstGeom prst="rect">
+            <a:avLst/>
+          </a:prstGeom>
+          <a:noFill/>
+          <a:ln>
+            <a:noFill/>
+          </a:ln>
+        </p:spPr>
+      </p:pic>
+    </p:spTree>
+  </p:cSld>
+  <p:clrMapOvr>
+    <a:masterClrMapping/>
+  </p:clrMapOvr>
+</p:sld>
+</file>
+
+<file path=ppt/slides/slide8.xml><?xml version="1.0" encoding="utf-8"?>
+<p:sld xmlns:a="http://schemas.openxmlformats.org/drawingml/2006/main" xmlns:r="http://schemas.openxmlformats.org/officeDocument/2006/relationships" xmlns:mc="http://schemas.openxmlformats.org/markup-compatibility/2006" xmlns:mv="urn:schemas-microsoft-com:mac:vml" xmlns:p="http://schemas.openxmlformats.org/presentationml/2006/main" xmlns:c="http://schemas.openxmlformats.org/drawingml/2006/chart" xmlns:dgm="http://schemas.openxmlformats.org/drawingml/2006/diagram" xmlns:o="urn:schemas-microsoft-com:office:office" xmlns:v="urn:schemas-microsoft-com:vml" xmlns:pvml="urn:schemas-microsoft-com:office:powerpoint" xmlns:com="http://schemas.openxmlformats.org/drawingml/2006/compatibility" xmlns:p14="http://schemas.microsoft.com/office/powerpoint/2010/main" xmlns:p15="http://schemas.microsoft.com/office/powerpoint/2012/main" xmlns:ahyp="http://schemas.microsoft.com/office/drawing/2018/hyperlinkcolor">
+  <p:cSld>
+    <p:spTree>
+      <p:nvGrpSpPr>
+        <p:cNvPr id="155" name="Shape 155"/>
+        <p:cNvGrpSpPr/>
+        <p:nvPr/>
+      </p:nvGrpSpPr>
+      <p:grpSpPr>
+        <a:xfrm>
+          <a:off x="0" y="0"/>
+          <a:ext cx="0" cy="0"/>
+          <a:chOff x="0" y="0"/>
+          <a:chExt cx="0" cy="0"/>
+        </a:xfrm>
+      </p:grpSpPr>
+      <p:sp>
+        <p:nvSpPr>
+          <p:cNvPr id="156" name="Google Shape;156;p20"/>
+          <p:cNvSpPr txBox="1"/>
+          <p:nvPr>
+            <p:ph type="title"/>
+          </p:nvPr>
+        </p:nvSpPr>
+        <p:spPr>
+          <a:xfrm>
+            <a:off x="685800" y="307965"/>
+            <a:ext cx="16916400" cy="1509000"/>
+          </a:xfrm>
+          <a:prstGeom prst="rect">
+            <a:avLst/>
+          </a:prstGeom>
+        </p:spPr>
+        <p:txBody>
+          <a:bodyPr anchorCtr="0" anchor="ctr" bIns="0" lIns="0" spcFirstLastPara="1" rIns="0" wrap="square" tIns="0">
+            <a:noAutofit/>
+          </a:bodyPr>
+          <a:lstStyle/>
+          <a:p>
+            <a:pPr indent="0" lvl="0" marL="0" rtl="0" algn="l">
+              <a:spcBef>
+                <a:spcPts val="0"/>
+              </a:spcBef>
+              <a:spcAft>
+                <a:spcPts val="0"/>
+              </a:spcAft>
+              <a:buNone/>
+            </a:pPr>
+            <a:r>
+              <a:rPr lang="en"/>
+              <a:t>The older, the better</a:t>
+            </a:r>
+            <a:endParaRPr/>
+          </a:p>
+        </p:txBody>
+      </p:sp>
+      <p:sp>
+        <p:nvSpPr>
+          <p:cNvPr id="157" name="Google Shape;157;p20"/>
+          <p:cNvSpPr txBox="1"/>
+          <p:nvPr>
+            <p:ph idx="1" type="body"/>
+          </p:nvPr>
+        </p:nvSpPr>
+        <p:spPr>
+          <a:xfrm>
+            <a:off x="685825" y="1828800"/>
+            <a:ext cx="16916400" cy="6629400"/>
+          </a:xfrm>
+          <a:prstGeom prst="rect">
+            <a:avLst/>
+          </a:prstGeom>
+          <a:effectLst>
+            <a:outerShdw blurRad="57150" rotWithShape="0" algn="bl" dir="5400000" dist="19050">
+              <a:srgbClr val="000000">
+                <a:alpha val="50000"/>
+              </a:srgbClr>
+            </a:outerShdw>
+            <a:reflection blurRad="0" dir="5400000" dist="38100" endA="0" fadeDir="5400012" kx="0" rotWithShape="0" algn="bl" stPos="0" sy="-100000" ky="0"/>
+          </a:effectLst>
+        </p:spPr>
+        <p:txBody>
+          <a:bodyPr anchorCtr="0" anchor="t" bIns="0" lIns="0" spcFirstLastPara="1" rIns="0" wrap="square" tIns="0">
+            <a:noAutofit/>
+          </a:bodyPr>
+          <a:lstStyle/>
+          <a:p>
+            <a:pPr indent="-685800" lvl="0" marL="914400" rtl="0" algn="l">
+              <a:lnSpc>
+                <a:spcPct val="100000"/>
+              </a:lnSpc>
+              <a:spcBef>
+                <a:spcPts val="1400"/>
+              </a:spcBef>
+              <a:spcAft>
+                <a:spcPts val="0"/>
+              </a:spcAft>
+              <a:buClr>
+                <a:schemeClr val="dk1"/>
+              </a:buClr>
+              <a:buSzPts val="3600"/>
+              <a:buChar char="●"/>
+            </a:pPr>
+            <a:r>
+              <a:rPr lang="en">
+                <a:solidFill>
+                  <a:srgbClr val="2D3D4A"/>
+                </a:solidFill>
+              </a:rPr>
+              <a:t>We can see some positive correlation between age and sleep quality</a:t>
+            </a:r>
+            <a:endParaRPr/>
+          </a:p>
+        </p:txBody>
+      </p:sp>
+      <p:pic>
+        <p:nvPicPr>
+          <p:cNvPr id="158" name="Google Shape;158;p20" title="Gráfico"/>
+          <p:cNvPicPr preferRelativeResize="0"/>
+          <p:nvPr/>
+        </p:nvPicPr>
+        <p:blipFill>
+          <a:blip r:embed="rId3">
+            <a:alphaModFix/>
+          </a:blip>
+          <a:stretch>
+            <a:fillRect/>
+          </a:stretch>
+        </p:blipFill>
+        <p:spPr>
+          <a:xfrm>
+            <a:off x="4274613" y="2410102"/>
+            <a:ext cx="9738774" cy="6048101"/>
+          </a:xfrm>
+          <a:prstGeom prst="rect">
+            <a:avLst/>
+          </a:prstGeom>
+          <a:noFill/>
+          <a:ln>
+            <a:noFill/>
+          </a:ln>
+        </p:spPr>
+      </p:pic>
+    </p:spTree>
+  </p:cSld>
+  <p:clrMapOvr>
+    <a:masterClrMapping/>
+  </p:clrMapOvr>
+</p:sld>
+</file>
+
+<file path=ppt/slides/slide9.xml><?xml version="1.0" encoding="utf-8"?>
+<p:sld xmlns:a="http://schemas.openxmlformats.org/drawingml/2006/main" xmlns:r="http://schemas.openxmlformats.org/officeDocument/2006/relationships" xmlns:mc="http://schemas.openxmlformats.org/markup-compatibility/2006" xmlns:mv="urn:schemas-microsoft-com:mac:vml" xmlns:p="http://schemas.openxmlformats.org/presentationml/2006/main" xmlns:c="http://schemas.openxmlformats.org/drawingml/2006/chart" xmlns:dgm="http://schemas.openxmlformats.org/drawingml/2006/diagram" xmlns:o="urn:schemas-microsoft-com:office:office" xmlns:v="urn:schemas-microsoft-com:vml" xmlns:pvml="urn:schemas-microsoft-com:office:powerpoint" xmlns:com="http://schemas.openxmlformats.org/drawingml/2006/compatibility" xmlns:p14="http://schemas.microsoft.com/office/powerpoint/2010/main" xmlns:p15="http://schemas.microsoft.com/office/powerpoint/2012/main" xmlns:ahyp="http://schemas.microsoft.com/office/drawing/2018/hyperlinkcolor">
+  <p:cSld>
+    <p:spTree>
+      <p:nvGrpSpPr>
+        <p:cNvPr id="162" name="Shape 162"/>
+        <p:cNvGrpSpPr/>
+        <p:nvPr/>
+      </p:nvGrpSpPr>
+      <p:grpSpPr>
+        <a:xfrm>
+          <a:off x="0" y="0"/>
+          <a:ext cx="0" cy="0"/>
+          <a:chOff x="0" y="0"/>
+          <a:chExt cx="0" cy="0"/>
+        </a:xfrm>
+      </p:grpSpPr>
+      <p:sp>
+        <p:nvSpPr>
+          <p:cNvPr id="163" name="Google Shape;163;p21"/>
+          <p:cNvSpPr txBox="1"/>
+          <p:nvPr>
+            <p:ph type="title"/>
+          </p:nvPr>
+        </p:nvSpPr>
+        <p:spPr>
+          <a:xfrm>
+            <a:off x="685800" y="307965"/>
+            <a:ext cx="16916400" cy="1509000"/>
+          </a:xfrm>
+          <a:prstGeom prst="rect">
+            <a:avLst/>
+          </a:prstGeom>
+        </p:spPr>
+        <p:txBody>
+          <a:bodyPr anchorCtr="0" anchor="ctr" bIns="0" lIns="0" spcFirstLastPara="1" rIns="0" wrap="square" tIns="0">
+            <a:noAutofit/>
+          </a:bodyPr>
+          <a:lstStyle/>
+          <a:p>
+            <a:pPr indent="0" lvl="0" marL="0" rtl="0" algn="l">
+              <a:spcBef>
+                <a:spcPts val="0"/>
+              </a:spcBef>
+              <a:spcAft>
+                <a:spcPts val="0"/>
+              </a:spcAft>
+              <a:buNone/>
+            </a:pPr>
+            <a:r>
+              <a:rPr lang="en"/>
+              <a:t>Sleep more, Sleep better</a:t>
+            </a:r>
+            <a:endParaRPr/>
+          </a:p>
+        </p:txBody>
+      </p:sp>
+      <p:sp>
+        <p:nvSpPr>
+          <p:cNvPr id="164" name="Google Shape;164;p21"/>
+          <p:cNvSpPr txBox="1"/>
+          <p:nvPr>
+            <p:ph idx="1" type="body"/>
+          </p:nvPr>
+        </p:nvSpPr>
+        <p:spPr>
+          <a:xfrm>
+            <a:off x="685825" y="1828800"/>
+            <a:ext cx="16916400" cy="6629400"/>
+          </a:xfrm>
+          <a:prstGeom prst="rect">
+            <a:avLst/>
+          </a:prstGeom>
+        </p:spPr>
+        <p:txBody>
+          <a:bodyPr anchorCtr="0" anchor="t" bIns="0" lIns="0" spcFirstLastPara="1" rIns="0" wrap="square" tIns="0">
+            <a:noAutofit/>
+          </a:bodyPr>
+          <a:lstStyle/>
+          <a:p>
+            <a:pPr indent="-685800" lvl="0" marL="914400" rtl="0" algn="l">
+              <a:lnSpc>
+                <a:spcPct val="100000"/>
+              </a:lnSpc>
+              <a:spcBef>
+                <a:spcPts val="0"/>
+              </a:spcBef>
+              <a:spcAft>
+                <a:spcPts val="0"/>
+              </a:spcAft>
+              <a:buClr>
+                <a:schemeClr val="dk1"/>
+              </a:buClr>
+              <a:buSzPts val="3600"/>
+              <a:buChar char="●"/>
+            </a:pPr>
+            <a:r>
+              <a:rPr lang="en">
+                <a:latin typeface="Open Sans Light"/>
+                <a:ea typeface="Open Sans Light"/>
+                <a:cs typeface="Open Sans Light"/>
+                <a:sym typeface="Open Sans Light"/>
+              </a:rPr>
+              <a:t>The obvious must be said?</a:t>
+            </a:r>
+            <a:endParaRPr/>
+          </a:p>
+        </p:txBody>
+      </p:sp>
+      <p:pic>
+        <p:nvPicPr>
+          <p:cNvPr id="165" name="Google Shape;165;p21" title="Gráfico"/>
+          <p:cNvPicPr preferRelativeResize="0"/>
+          <p:nvPr/>
+        </p:nvPicPr>
+        <p:blipFill>
+          <a:blip r:embed="rId3">
+            <a:alphaModFix/>
+          </a:blip>
+          <a:stretch>
+            <a:fillRect/>
+          </a:stretch>
+        </p:blipFill>
+        <p:spPr>
+          <a:xfrm>
+            <a:off x="4241325" y="2368748"/>
+            <a:ext cx="9805348" cy="6089449"/>
+          </a:xfrm>
+          <a:prstGeom prst="rect">
+            <a:avLst/>
           </a:prstGeom>
           <a:noFill/>
           <a:ln>

</xml_diff>